<commit_message>
Final slides lesson 1.
</commit_message>
<xml_diff>
--- a/lessons/lesson_1/slides_lesson_1.pptx
+++ b/lessons/lesson_1/slides_lesson_1.pptx
@@ -9,8 +9,12 @@
     <p:sldId id="260" r:id="rId3"/>
     <p:sldId id="258" r:id="rId4"/>
     <p:sldId id="259" r:id="rId5"/>
-    <p:sldId id="261" r:id="rId6"/>
-    <p:sldId id="262" r:id="rId7"/>
+    <p:sldId id="267" r:id="rId6"/>
+    <p:sldId id="261" r:id="rId7"/>
+    <p:sldId id="262" r:id="rId8"/>
+    <p:sldId id="264" r:id="rId9"/>
+    <p:sldId id="265" r:id="rId10"/>
+    <p:sldId id="266" r:id="rId11"/>
   </p:sldIdLst>
   <p:sldSz cx="12192000" cy="6858000"/>
   <p:notesSz cx="6858000" cy="9144000"/>
@@ -3418,6 +3422,147 @@
 </p:sld>
 </file>
 
+<file path=ppt/slides/slide10.xml><?xml version="1.0" encoding="utf-8"?>
+<p:sld xmlns:a="http://schemas.openxmlformats.org/drawingml/2006/main" xmlns:r="http://schemas.openxmlformats.org/officeDocument/2006/relationships" xmlns:p="http://schemas.openxmlformats.org/presentationml/2006/main">
+  <p:cSld>
+    <p:spTree>
+      <p:nvGrpSpPr>
+        <p:cNvPr id="1" name="">
+          <a:extLst>
+            <a:ext uri="{FF2B5EF4-FFF2-40B4-BE49-F238E27FC236}">
+              <a16:creationId xmlns:a16="http://schemas.microsoft.com/office/drawing/2014/main" id="{D958C4E1-EAA5-90D3-143A-D94BF98C4013}"/>
+            </a:ext>
+          </a:extLst>
+        </p:cNvPr>
+        <p:cNvGrpSpPr/>
+        <p:nvPr/>
+      </p:nvGrpSpPr>
+      <p:grpSpPr>
+        <a:xfrm>
+          <a:off x="0" y="0"/>
+          <a:ext cx="0" cy="0"/>
+          <a:chOff x="0" y="0"/>
+          <a:chExt cx="0" cy="0"/>
+        </a:xfrm>
+      </p:grpSpPr>
+      <p:sp>
+        <p:nvSpPr>
+          <p:cNvPr id="5" name="Title 1">
+            <a:extLst>
+              <a:ext uri="{FF2B5EF4-FFF2-40B4-BE49-F238E27FC236}">
+                <a16:creationId xmlns:a16="http://schemas.microsoft.com/office/drawing/2014/main" id="{C7E42EA5-D958-DD87-403B-5288C52D4B5D}"/>
+              </a:ext>
+            </a:extLst>
+          </p:cNvPr>
+          <p:cNvSpPr>
+            <a:spLocks noGrp="1"/>
+          </p:cNvSpPr>
+          <p:nvPr>
+            <p:ph type="title"/>
+          </p:nvPr>
+        </p:nvSpPr>
+        <p:spPr>
+          <a:xfrm>
+            <a:off x="827690" y="365125"/>
+            <a:ext cx="10515600" cy="1325563"/>
+          </a:xfrm>
+        </p:spPr>
+        <p:txBody>
+          <a:bodyPr/>
+          <a:lstStyle/>
+          <a:p>
+            <a:r>
+              <a:rPr lang="en-DK" dirty="0"/>
+              <a:t>Content: </a:t>
+            </a:r>
+            <a:r>
+              <a:rPr lang="en-GB" dirty="0">
+                <a:hlinkClick r:id="rId2"/>
+              </a:rPr>
+              <a:t>github.com/Mads-PeterVC/imlms/</a:t>
+            </a:r>
+            <a:endParaRPr lang="en-DK" dirty="0"/>
+          </a:p>
+        </p:txBody>
+      </p:sp>
+      <p:pic>
+        <p:nvPicPr>
+          <p:cNvPr id="6" name="Picture 5" descr="A screenshot of a computer&#10;&#10;AI-generated content may be incorrect.">
+            <a:extLst>
+              <a:ext uri="{FF2B5EF4-FFF2-40B4-BE49-F238E27FC236}">
+                <a16:creationId xmlns:a16="http://schemas.microsoft.com/office/drawing/2014/main" id="{941CA4FA-1EF1-977C-7792-EB935A1F0F93}"/>
+              </a:ext>
+            </a:extLst>
+          </p:cNvPr>
+          <p:cNvPicPr>
+            <a:picLocks noChangeAspect="1"/>
+          </p:cNvPicPr>
+          <p:nvPr/>
+        </p:nvPicPr>
+        <p:blipFill>
+          <a:blip r:embed="rId3"/>
+          <a:stretch>
+            <a:fillRect/>
+          </a:stretch>
+        </p:blipFill>
+        <p:spPr>
+          <a:xfrm>
+            <a:off x="417787" y="2175640"/>
+            <a:ext cx="9741198" cy="3595885"/>
+          </a:xfrm>
+          <a:prstGeom prst="rect">
+            <a:avLst/>
+          </a:prstGeom>
+        </p:spPr>
+      </p:pic>
+      <p:sp>
+        <p:nvSpPr>
+          <p:cNvPr id="7" name="TextBox 6">
+            <a:extLst>
+              <a:ext uri="{FF2B5EF4-FFF2-40B4-BE49-F238E27FC236}">
+                <a16:creationId xmlns:a16="http://schemas.microsoft.com/office/drawing/2014/main" id="{BDA20495-C3C0-5A9E-349D-C3D2B88F4ABF}"/>
+              </a:ext>
+            </a:extLst>
+          </p:cNvPr>
+          <p:cNvSpPr txBox="1"/>
+          <p:nvPr/>
+        </p:nvSpPr>
+        <p:spPr>
+          <a:xfrm>
+            <a:off x="10226566" y="2186152"/>
+            <a:ext cx="1671144" cy="1754326"/>
+          </a:xfrm>
+          <a:prstGeom prst="rect">
+            <a:avLst/>
+          </a:prstGeom>
+          <a:noFill/>
+        </p:spPr>
+        <p:txBody>
+          <a:bodyPr wrap="square" rtlCol="0">
+            <a:spAutoFit/>
+          </a:bodyPr>
+          <a:lstStyle/>
+          <a:p>
+            <a:r>
+              <a:rPr lang="en-DK" dirty="0"/>
+              <a:t>Others are exercises with parts or all of the code left for you to write.</a:t>
+            </a:r>
+          </a:p>
+        </p:txBody>
+      </p:sp>
+    </p:spTree>
+    <p:extLst>
+      <p:ext uri="{BB962C8B-B14F-4D97-AF65-F5344CB8AC3E}">
+        <p14:creationId xmlns:p14="http://schemas.microsoft.com/office/powerpoint/2010/main" val="1137459639"/>
+      </p:ext>
+    </p:extLst>
+  </p:cSld>
+  <p:clrMapOvr>
+    <a:masterClrMapping/>
+  </p:clrMapOvr>
+</p:sld>
+</file>
+
 <file path=ppt/slides/slide2.xml><?xml version="1.0" encoding="utf-8"?>
 <p:sld xmlns:a="http://schemas.openxmlformats.org/drawingml/2006/main" xmlns:r="http://schemas.openxmlformats.org/officeDocument/2006/relationships" xmlns:p="http://schemas.openxmlformats.org/presentationml/2006/main">
   <p:cSld>
@@ -3477,8 +3622,8 @@
         </p:nvSpPr>
         <p:spPr>
           <a:xfrm>
-            <a:off x="1072055" y="1690688"/>
-            <a:ext cx="8681545" cy="1200329"/>
+            <a:off x="1145628" y="1606605"/>
+            <a:ext cx="4235669" cy="2031325"/>
           </a:xfrm>
           <a:prstGeom prst="rect">
             <a:avLst/>
@@ -3519,8 +3664,8 @@
         </p:nvSpPr>
         <p:spPr>
           <a:xfrm>
-            <a:off x="1072055" y="3534104"/>
-            <a:ext cx="8681545" cy="1200329"/>
+            <a:off x="1145628" y="4038600"/>
+            <a:ext cx="3762704" cy="2308324"/>
           </a:xfrm>
           <a:prstGeom prst="rect">
             <a:avLst/>
@@ -3603,6 +3748,107 @@
           </a:p>
         </p:txBody>
       </p:sp>
+      <p:pic>
+        <p:nvPicPr>
+          <p:cNvPr id="7" name="Picture 6" descr="Crystal structure - Wikipedia">
+            <a:extLst>
+              <a:ext uri="{FF2B5EF4-FFF2-40B4-BE49-F238E27FC236}">
+                <a16:creationId xmlns:a16="http://schemas.microsoft.com/office/drawing/2014/main" id="{C36E4544-5112-5438-599F-66A0A54DB0AD}"/>
+              </a:ext>
+            </a:extLst>
+          </p:cNvPr>
+          <p:cNvPicPr>
+            <a:picLocks noChangeAspect="1" noChangeArrowheads="1"/>
+          </p:cNvPicPr>
+          <p:nvPr/>
+        </p:nvPicPr>
+        <p:blipFill>
+          <a:blip r:embed="rId2">
+            <a:extLst>
+              <a:ext uri="{28A0092B-C50C-407E-A947-70E740481C1C}">
+                <a14:useLocalDpi xmlns:a14="http://schemas.microsoft.com/office/drawing/2010/main" val="0"/>
+              </a:ext>
+            </a:extLst>
+          </a:blip>
+          <a:stretch>
+            <a:fillRect/>
+          </a:stretch>
+        </p:blipFill>
+        <p:spPr bwMode="auto">
+          <a:xfrm>
+            <a:off x="8120684" y="3429000"/>
+            <a:ext cx="2925688" cy="2773704"/>
+          </a:xfrm>
+          <a:prstGeom prst="rect">
+            <a:avLst/>
+          </a:prstGeom>
+          <a:noFill/>
+          <a:extLst>
+            <a:ext uri="{909E8E84-426E-40DD-AFC4-6F175D3DCCD1}">
+              <a14:hiddenFill xmlns:a14="http://schemas.microsoft.com/office/drawing/2010/main">
+                <a:solidFill>
+                  <a:srgbClr val="FFFFFF"/>
+                </a:solidFill>
+              </a14:hiddenFill>
+            </a:ext>
+          </a:extLst>
+        </p:spPr>
+      </p:pic>
+      <p:pic>
+        <p:nvPicPr>
+          <p:cNvPr id="8" name="Picture 6" descr="Single atom catalysts">
+            <a:extLst>
+              <a:ext uri="{FF2B5EF4-FFF2-40B4-BE49-F238E27FC236}">
+                <a16:creationId xmlns:a16="http://schemas.microsoft.com/office/drawing/2014/main" id="{0694096E-B331-786D-CF58-A74EAC3DB6EF}"/>
+              </a:ext>
+            </a:extLst>
+          </p:cNvPr>
+          <p:cNvPicPr>
+            <a:picLocks noChangeAspect="1" noChangeArrowheads="1"/>
+          </p:cNvPicPr>
+          <p:nvPr/>
+        </p:nvPicPr>
+        <p:blipFill>
+          <a:blip r:embed="rId3">
+            <a:extLst>
+              <a:ext uri="{28A0092B-C50C-407E-A947-70E740481C1C}">
+                <a14:useLocalDpi xmlns:a14="http://schemas.microsoft.com/office/drawing/2010/main" val="0"/>
+              </a:ext>
+            </a:extLst>
+          </a:blip>
+          <a:stretch>
+            <a:fillRect/>
+          </a:stretch>
+        </p:blipFill>
+        <p:spPr bwMode="auto">
+          <a:xfrm>
+            <a:off x="8313518" y="973996"/>
+            <a:ext cx="3252903" cy="1821625"/>
+          </a:xfrm>
+          <a:prstGeom prst="rect">
+            <a:avLst/>
+          </a:prstGeom>
+          <a:ln>
+            <a:noFill/>
+          </a:ln>
+          <a:effectLst>
+            <a:outerShdw blurRad="292100" dist="139700" dir="2700000" algn="tl" rotWithShape="0">
+              <a:srgbClr val="333333">
+                <a:alpha val="65000"/>
+              </a:srgbClr>
+            </a:outerShdw>
+          </a:effectLst>
+          <a:extLst>
+            <a:ext uri="{909E8E84-426E-40DD-AFC4-6F175D3DCCD1}">
+              <a14:hiddenFill xmlns:a14="http://schemas.microsoft.com/office/drawing/2010/main">
+                <a:solidFill>
+                  <a:srgbClr val="FFFFFF"/>
+                </a:solidFill>
+              </a14:hiddenFill>
+            </a:ext>
+          </a:extLst>
+        </p:spPr>
+      </p:pic>
     </p:spTree>
     <p:extLst>
       <p:ext uri="{BB962C8B-B14F-4D97-AF65-F5344CB8AC3E}">
@@ -3661,6 +3907,103 @@
           </a:p>
         </p:txBody>
       </p:sp>
+      <p:sp>
+        <p:nvSpPr>
+          <p:cNvPr id="8" name="TextBox 7">
+            <a:extLst>
+              <a:ext uri="{FF2B5EF4-FFF2-40B4-BE49-F238E27FC236}">
+                <a16:creationId xmlns:a16="http://schemas.microsoft.com/office/drawing/2014/main" id="{99C98FF7-B346-4FC8-C29D-200234CAB2DD}"/>
+              </a:ext>
+            </a:extLst>
+          </p:cNvPr>
+          <p:cNvSpPr txBox="1"/>
+          <p:nvPr/>
+        </p:nvSpPr>
+        <p:spPr>
+          <a:xfrm>
+            <a:off x="1082565" y="1690688"/>
+            <a:ext cx="5013435" cy="1754326"/>
+          </a:xfrm>
+          <a:prstGeom prst="rect">
+            <a:avLst/>
+          </a:prstGeom>
+          <a:noFill/>
+        </p:spPr>
+        <p:txBody>
+          <a:bodyPr wrap="square">
+            <a:spAutoFit/>
+          </a:bodyPr>
+          <a:lstStyle/>
+          <a:p>
+            <a:r>
+              <a:rPr lang="en-GB" dirty="0"/>
+              <a:t>“Machine learning is a branch of artificial intelligence that involves developing algorithms and models that enable computers </a:t>
+            </a:r>
+            <a:r>
+              <a:rPr lang="en-GB" b="1" dirty="0"/>
+              <a:t>to learn patterns and make decisions or predictions from data</a:t>
+            </a:r>
+            <a:r>
+              <a:rPr lang="en-GB" dirty="0"/>
+              <a:t> without being explicitly programmed.”</a:t>
+            </a:r>
+          </a:p>
+          <a:p>
+            <a:r>
+              <a:rPr lang="en-GB" dirty="0"/>
+              <a:t>- ChatGPT</a:t>
+            </a:r>
+            <a:endParaRPr lang="en-DK" dirty="0"/>
+          </a:p>
+        </p:txBody>
+      </p:sp>
+      <p:pic>
+        <p:nvPicPr>
+          <p:cNvPr id="2050" name="Picture 2" descr="xkcd: Machine Learning">
+            <a:extLst>
+              <a:ext uri="{FF2B5EF4-FFF2-40B4-BE49-F238E27FC236}">
+                <a16:creationId xmlns:a16="http://schemas.microsoft.com/office/drawing/2014/main" id="{172A28C4-9E8D-F4E3-CC08-30FB04DF8448}"/>
+              </a:ext>
+            </a:extLst>
+          </p:cNvPr>
+          <p:cNvPicPr>
+            <a:picLocks noChangeAspect="1" noChangeArrowheads="1"/>
+          </p:cNvPicPr>
+          <p:nvPr/>
+        </p:nvPicPr>
+        <p:blipFill>
+          <a:blip r:embed="rId2">
+            <a:extLst>
+              <a:ext uri="{28A0092B-C50C-407E-A947-70E740481C1C}">
+                <a14:useLocalDpi xmlns:a14="http://schemas.microsoft.com/office/drawing/2010/main" val="0"/>
+              </a:ext>
+            </a:extLst>
+          </a:blip>
+          <a:srcRect/>
+          <a:stretch>
+            <a:fillRect/>
+          </a:stretch>
+        </p:blipFill>
+        <p:spPr bwMode="auto">
+          <a:xfrm>
+            <a:off x="6886465" y="657364"/>
+            <a:ext cx="4711700" cy="5575300"/>
+          </a:xfrm>
+          <a:prstGeom prst="rect">
+            <a:avLst/>
+          </a:prstGeom>
+          <a:noFill/>
+          <a:extLst>
+            <a:ext uri="{909E8E84-426E-40DD-AFC4-6F175D3DCCD1}">
+              <a14:hiddenFill xmlns:a14="http://schemas.microsoft.com/office/drawing/2010/main">
+                <a:solidFill>
+                  <a:srgbClr val="FFFFFF"/>
+                </a:solidFill>
+              </a14:hiddenFill>
+            </a:ext>
+          </a:extLst>
+        </p:spPr>
+      </p:pic>
     </p:spTree>
     <p:extLst>
       <p:ext uri="{BB962C8B-B14F-4D97-AF65-F5344CB8AC3E}">
@@ -3714,11 +4057,170 @@
           <a:p>
             <a:r>
               <a:rPr lang="en-DK" dirty="0"/>
-              <a:t>Workshop Structure</a:t>
-            </a:r>
-          </a:p>
-        </p:txBody>
-      </p:sp>
+              <a:t>Workshop structure</a:t>
+            </a:r>
+          </a:p>
+        </p:txBody>
+      </p:sp>
+      <p:sp>
+        <p:nvSpPr>
+          <p:cNvPr id="9" name="TextBox 8">
+            <a:extLst>
+              <a:ext uri="{FF2B5EF4-FFF2-40B4-BE49-F238E27FC236}">
+                <a16:creationId xmlns:a16="http://schemas.microsoft.com/office/drawing/2014/main" id="{FF25D02A-AA0E-4969-3D0C-FE22FD5AE6F3}"/>
+              </a:ext>
+            </a:extLst>
+          </p:cNvPr>
+          <p:cNvSpPr txBox="1"/>
+          <p:nvPr/>
+        </p:nvSpPr>
+        <p:spPr>
+          <a:xfrm>
+            <a:off x="838200" y="1859652"/>
+            <a:ext cx="6096000" cy="3693319"/>
+          </a:xfrm>
+          <a:prstGeom prst="rect">
+            <a:avLst/>
+          </a:prstGeom>
+          <a:noFill/>
+        </p:spPr>
+        <p:txBody>
+          <a:bodyPr wrap="square">
+            <a:spAutoFit/>
+          </a:bodyPr>
+          <a:lstStyle/>
+          <a:p>
+            <a:r>
+              <a:rPr lang="en-GB" dirty="0"/>
+              <a:t>We have 6 lessons over the next two weeks – the outline of the subjects for each lesson is as follow</a:t>
+            </a:r>
+          </a:p>
+          <a:p>
+            <a:br>
+              <a:rPr lang="en-GB" dirty="0"/>
+            </a:br>
+            <a:r>
+              <a:rPr lang="en-GB" dirty="0"/>
+              <a:t>1. Python for computational science intro / recap </a:t>
+            </a:r>
+          </a:p>
+          <a:p>
+            <a:r>
+              <a:rPr lang="en-GB" dirty="0"/>
+              <a:t>2. Torch / The Atomic Simulation Environment</a:t>
+            </a:r>
+          </a:p>
+          <a:p>
+            <a:r>
+              <a:rPr lang="en-GB" dirty="0"/>
+              <a:t>3. Potential energy surfaces</a:t>
+            </a:r>
+          </a:p>
+          <a:p>
+            <a:r>
+              <a:rPr lang="en-GB" dirty="0"/>
+              <a:t>4. Introduction to Machine Learning </a:t>
+            </a:r>
+          </a:p>
+          <a:p>
+            <a:r>
+              <a:rPr lang="en-GB" dirty="0"/>
+              <a:t>5. Machine Learning for atomic systems 1 </a:t>
+            </a:r>
+          </a:p>
+          <a:p>
+            <a:r>
+              <a:rPr lang="en-GB" dirty="0"/>
+              <a:t>6. Machine Learning for atomic systems 2</a:t>
+            </a:r>
+          </a:p>
+          <a:p>
+            <a:endParaRPr lang="en-GB" dirty="0"/>
+          </a:p>
+          <a:p>
+            <a:r>
+              <a:rPr lang="en-GB" dirty="0"/>
+              <a:t>Each lesson will be partly a presentation and partly you working on the exercises. </a:t>
+            </a:r>
+            <a:br>
+              <a:rPr lang="en-GB" dirty="0"/>
+            </a:br>
+            <a:endParaRPr lang="en-GB" dirty="0"/>
+          </a:p>
+        </p:txBody>
+      </p:sp>
+      <p:pic>
+        <p:nvPicPr>
+          <p:cNvPr id="11" name="Graphic 10" descr="Teacher with solid fill">
+            <a:extLst>
+              <a:ext uri="{FF2B5EF4-FFF2-40B4-BE49-F238E27FC236}">
+                <a16:creationId xmlns:a16="http://schemas.microsoft.com/office/drawing/2014/main" id="{9D334826-0F4D-DBBA-4EB0-B6CC4965492A}"/>
+              </a:ext>
+            </a:extLst>
+          </p:cNvPr>
+          <p:cNvPicPr>
+            <a:picLocks noChangeAspect="1"/>
+          </p:cNvPicPr>
+          <p:nvPr/>
+        </p:nvPicPr>
+        <p:blipFill>
+          <a:blip r:embed="rId2">
+            <a:extLst>
+              <a:ext uri="{96DAC541-7B7A-43D3-8B79-37D633B846F1}">
+                <asvg:svgBlip xmlns:asvg="http://schemas.microsoft.com/office/drawing/2016/SVG/main" r:embed="rId3"/>
+              </a:ext>
+            </a:extLst>
+          </a:blip>
+          <a:stretch>
+            <a:fillRect/>
+          </a:stretch>
+        </p:blipFill>
+        <p:spPr>
+          <a:xfrm>
+            <a:off x="7468770" y="1000611"/>
+            <a:ext cx="2675207" cy="2675207"/>
+          </a:xfrm>
+          <a:prstGeom prst="rect">
+            <a:avLst/>
+          </a:prstGeom>
+        </p:spPr>
+      </p:pic>
+      <p:pic>
+        <p:nvPicPr>
+          <p:cNvPr id="15" name="Graphic 14" descr="Computer outline">
+            <a:extLst>
+              <a:ext uri="{FF2B5EF4-FFF2-40B4-BE49-F238E27FC236}">
+                <a16:creationId xmlns:a16="http://schemas.microsoft.com/office/drawing/2014/main" id="{1680BABB-0B62-76BF-6FE2-480870CEA866}"/>
+              </a:ext>
+            </a:extLst>
+          </p:cNvPr>
+          <p:cNvPicPr>
+            <a:picLocks noChangeAspect="1"/>
+          </p:cNvPicPr>
+          <p:nvPr/>
+        </p:nvPicPr>
+        <p:blipFill>
+          <a:blip r:embed="rId4">
+            <a:extLst>
+              <a:ext uri="{96DAC541-7B7A-43D3-8B79-37D633B846F1}">
+                <asvg:svgBlip xmlns:asvg="http://schemas.microsoft.com/office/drawing/2016/SVG/main" r:embed="rId5"/>
+              </a:ext>
+            </a:extLst>
+          </a:blip>
+          <a:stretch>
+            <a:fillRect/>
+          </a:stretch>
+        </p:blipFill>
+        <p:spPr>
+          <a:xfrm>
+            <a:off x="8678593" y="3429000"/>
+            <a:ext cx="2675207" cy="2675207"/>
+          </a:xfrm>
+          <a:prstGeom prst="rect">
+            <a:avLst/>
+          </a:prstGeom>
+        </p:spPr>
+      </p:pic>
     </p:spTree>
     <p:extLst>
       <p:ext uri="{BB962C8B-B14F-4D97-AF65-F5344CB8AC3E}">
@@ -3754,7 +4256,7 @@
           <p:cNvPr id="2" name="Title 1">
             <a:extLst>
               <a:ext uri="{FF2B5EF4-FFF2-40B4-BE49-F238E27FC236}">
-                <a16:creationId xmlns:a16="http://schemas.microsoft.com/office/drawing/2014/main" id="{2E450404-3F13-44B9-5EDD-5A7BEA1774C1}"/>
+                <a16:creationId xmlns:a16="http://schemas.microsoft.com/office/drawing/2014/main" id="{C8E13B56-8AA1-571E-F05A-ED868EF132B5}"/>
               </a:ext>
             </a:extLst>
           </p:cNvPr>
@@ -3765,82 +4267,164 @@
             <p:ph type="title"/>
           </p:nvPr>
         </p:nvSpPr>
-        <p:spPr/>
+        <p:spPr>
+          <a:xfrm>
+            <a:off x="838200" y="365125"/>
+            <a:ext cx="3513079" cy="1325563"/>
+          </a:xfrm>
+        </p:spPr>
         <p:txBody>
           <a:bodyPr/>
           <a:lstStyle/>
           <a:p>
             <a:r>
               <a:rPr lang="en-DK" dirty="0"/>
-              <a:t>Content: </a:t>
-            </a:r>
-            <a:r>
-              <a:rPr lang="en-GB" dirty="0">
-                <a:hlinkClick r:id="rId2"/>
-              </a:rPr>
-              <a:t>github.com/Mads-PeterVC/imlms/</a:t>
-            </a:r>
-            <a:endParaRPr lang="en-DK" dirty="0"/>
+              <a:t>Experimental</a:t>
+            </a:r>
           </a:p>
         </p:txBody>
       </p:sp>
       <p:pic>
         <p:nvPicPr>
-          <p:cNvPr id="5" name="Picture 4" descr="A screenshot of a computer&#10;&#10;AI-generated content may be incorrect.">
-            <a:extLst>
-              <a:ext uri="{FF2B5EF4-FFF2-40B4-BE49-F238E27FC236}">
-                <a16:creationId xmlns:a16="http://schemas.microsoft.com/office/drawing/2014/main" id="{6208F183-49DA-2CEA-381E-56D4FA3418A0}"/>
+          <p:cNvPr id="1026" name="Picture 2" descr="Digital Multimeter, Multimeter With Ac Dc Voltmeter &amp; Ohm Volt Amp">
+            <a:extLst>
+              <a:ext uri="{FF2B5EF4-FFF2-40B4-BE49-F238E27FC236}">
+                <a16:creationId xmlns:a16="http://schemas.microsoft.com/office/drawing/2014/main" id="{36D501BA-C9CB-8171-A8FA-E8412CC88552}"/>
               </a:ext>
             </a:extLst>
           </p:cNvPr>
           <p:cNvPicPr>
-            <a:picLocks noChangeAspect="1"/>
+            <a:picLocks noChangeAspect="1" noChangeArrowheads="1"/>
           </p:cNvPicPr>
           <p:nvPr/>
         </p:nvPicPr>
         <p:blipFill>
-          <a:blip r:embed="rId3"/>
+          <a:blip r:embed="rId2">
+            <a:extLst>
+              <a:ext uri="{28A0092B-C50C-407E-A947-70E740481C1C}">
+                <a14:useLocalDpi xmlns:a14="http://schemas.microsoft.com/office/drawing/2010/main" val="0"/>
+              </a:ext>
+            </a:extLst>
+          </a:blip>
+          <a:srcRect/>
           <a:stretch>
             <a:fillRect/>
           </a:stretch>
         </p:blipFill>
-        <p:spPr>
+        <p:spPr bwMode="auto">
           <a:xfrm>
-            <a:off x="1969376" y="1937188"/>
-            <a:ext cx="7772400" cy="3937000"/>
+            <a:off x="1380360" y="2575034"/>
+            <a:ext cx="2458544" cy="2458544"/>
           </a:xfrm>
           <a:prstGeom prst="rect">
             <a:avLst/>
           </a:prstGeom>
+          <a:noFill/>
+          <a:extLst>
+            <a:ext uri="{909E8E84-426E-40DD-AFC4-6F175D3DCCD1}">
+              <a14:hiddenFill xmlns:a14="http://schemas.microsoft.com/office/drawing/2010/main">
+                <a:solidFill>
+                  <a:srgbClr val="FFFFFF"/>
+                </a:solidFill>
+              </a14:hiddenFill>
+            </a:ext>
+          </a:extLst>
         </p:spPr>
       </p:pic>
+      <p:sp>
+        <p:nvSpPr>
+          <p:cNvPr id="4" name="TextBox 3">
+            <a:extLst>
+              <a:ext uri="{FF2B5EF4-FFF2-40B4-BE49-F238E27FC236}">
+                <a16:creationId xmlns:a16="http://schemas.microsoft.com/office/drawing/2014/main" id="{73B97FB8-63AF-A3FF-24F2-C54A2C0697B6}"/>
+              </a:ext>
+            </a:extLst>
+          </p:cNvPr>
+          <p:cNvSpPr txBox="1"/>
+          <p:nvPr/>
+        </p:nvSpPr>
+        <p:spPr>
+          <a:xfrm>
+            <a:off x="1040524" y="1690688"/>
+            <a:ext cx="3783724" cy="646331"/>
+          </a:xfrm>
+          <a:prstGeom prst="rect">
+            <a:avLst/>
+          </a:prstGeom>
+          <a:noFill/>
+        </p:spPr>
+        <p:txBody>
+          <a:bodyPr wrap="square" rtlCol="0">
+            <a:spAutoFit/>
+          </a:bodyPr>
+          <a:lstStyle/>
+          <a:p>
+            <a:r>
+              <a:rPr lang="en-DK" dirty="0"/>
+              <a:t>In one of my first projects at uni I fried two expensive voltmeters.</a:t>
+            </a:r>
+          </a:p>
+        </p:txBody>
+      </p:sp>
+      <p:sp>
+        <p:nvSpPr>
+          <p:cNvPr id="5" name="TextBox 4">
+            <a:extLst>
+              <a:ext uri="{FF2B5EF4-FFF2-40B4-BE49-F238E27FC236}">
+                <a16:creationId xmlns:a16="http://schemas.microsoft.com/office/drawing/2014/main" id="{7BE6B8EA-DD85-0ABD-EF41-4F36C9F68BC4}"/>
+              </a:ext>
+            </a:extLst>
+          </p:cNvPr>
+          <p:cNvSpPr txBox="1"/>
+          <p:nvPr/>
+        </p:nvSpPr>
+        <p:spPr>
+          <a:xfrm>
+            <a:off x="838200" y="5276193"/>
+            <a:ext cx="3986048" cy="646331"/>
+          </a:xfrm>
+          <a:prstGeom prst="rect">
+            <a:avLst/>
+          </a:prstGeom>
+          <a:noFill/>
+        </p:spPr>
+        <p:txBody>
+          <a:bodyPr wrap="square" rtlCol="0">
+            <a:spAutoFit/>
+          </a:bodyPr>
+          <a:lstStyle/>
+          <a:p>
+            <a:r>
+              <a:rPr lang="en-DK" dirty="0"/>
+              <a:t>My professor probably regretted teaching through exercises that day.</a:t>
+            </a:r>
+          </a:p>
+        </p:txBody>
+      </p:sp>
       <p:cxnSp>
         <p:nvCxnSpPr>
-          <p:cNvPr id="7" name="Straight Arrow Connector 6">
-            <a:extLst>
-              <a:ext uri="{FF2B5EF4-FFF2-40B4-BE49-F238E27FC236}">
-                <a16:creationId xmlns:a16="http://schemas.microsoft.com/office/drawing/2014/main" id="{042EAC75-3377-6A58-E4E9-9980E459011A}"/>
-              </a:ext>
-            </a:extLst>
-          </p:cNvPr>
-          <p:cNvCxnSpPr>
-            <a:cxnSpLocks/>
-          </p:cNvCxnSpPr>
+          <p:cNvPr id="7" name="Straight Connector 6">
+            <a:extLst>
+              <a:ext uri="{FF2B5EF4-FFF2-40B4-BE49-F238E27FC236}">
+                <a16:creationId xmlns:a16="http://schemas.microsoft.com/office/drawing/2014/main" id="{586C7948-1FA7-ABE6-75D2-18A7AD2FAEEA}"/>
+              </a:ext>
+            </a:extLst>
+          </p:cNvPr>
+          <p:cNvCxnSpPr/>
           <p:nvPr/>
         </p:nvCxnSpPr>
         <p:spPr>
-          <a:xfrm flipH="1">
-            <a:off x="6180083" y="3710152"/>
-            <a:ext cx="4042541" cy="195536"/>
-          </a:xfrm>
-          <a:prstGeom prst="straightConnector1">
+          <a:xfrm>
+            <a:off x="6096000" y="0"/>
+            <a:ext cx="0" cy="7535917"/>
+          </a:xfrm>
+          <a:prstGeom prst="line">
             <a:avLst/>
           </a:prstGeom>
-          <a:ln>
+          <a:ln w="38100">
             <a:solidFill>
-              <a:srgbClr val="FF0000"/>
+              <a:schemeClr val="tx1"/>
             </a:solidFill>
-            <a:tailEnd type="triangle"/>
           </a:ln>
         </p:spPr>
         <p:style>
@@ -3860,10 +4444,94 @@
       </p:cxnSp>
       <p:sp>
         <p:nvSpPr>
-          <p:cNvPr id="9" name="TextBox 8">
-            <a:extLst>
-              <a:ext uri="{FF2B5EF4-FFF2-40B4-BE49-F238E27FC236}">
-                <a16:creationId xmlns:a16="http://schemas.microsoft.com/office/drawing/2014/main" id="{DCB6B069-F8E3-AB79-A68E-4C5BCEEE5023}"/>
+          <p:cNvPr id="8" name="Title 1">
+            <a:extLst>
+              <a:ext uri="{FF2B5EF4-FFF2-40B4-BE49-F238E27FC236}">
+                <a16:creationId xmlns:a16="http://schemas.microsoft.com/office/drawing/2014/main" id="{8C692DD9-51F7-8379-93E2-3663687DC033}"/>
+              </a:ext>
+            </a:extLst>
+          </p:cNvPr>
+          <p:cNvSpPr txBox="1">
+            <a:spLocks/>
+          </p:cNvSpPr>
+          <p:nvPr/>
+        </p:nvSpPr>
+        <p:spPr>
+          <a:xfrm>
+            <a:off x="7472856" y="228490"/>
+            <a:ext cx="3783707" cy="1325563"/>
+          </a:xfrm>
+          <a:prstGeom prst="rect">
+            <a:avLst/>
+          </a:prstGeom>
+        </p:spPr>
+        <p:txBody>
+          <a:bodyPr vert="horz" lIns="91440" tIns="45720" rIns="91440" bIns="45720" rtlCol="0" anchor="ctr">
+            <a:normAutofit/>
+          </a:bodyPr>
+          <a:lstStyle>
+            <a:lvl1pPr algn="l" defTabSz="914400" rtl="0" eaLnBrk="1" latinLnBrk="0" hangingPunct="1">
+              <a:lnSpc>
+                <a:spcPct val="90000"/>
+              </a:lnSpc>
+              <a:spcBef>
+                <a:spcPct val="0"/>
+              </a:spcBef>
+              <a:buNone/>
+              <a:defRPr sz="4400" kern="1200">
+                <a:solidFill>
+                  <a:schemeClr val="tx1"/>
+                </a:solidFill>
+                <a:latin typeface="+mj-lt"/>
+                <a:ea typeface="+mj-ea"/>
+                <a:cs typeface="+mj-cs"/>
+              </a:defRPr>
+            </a:lvl1pPr>
+          </a:lstStyle>
+          <a:p>
+            <a:r>
+              <a:rPr lang="en-DK" dirty="0"/>
+              <a:t>Computational</a:t>
+            </a:r>
+          </a:p>
+        </p:txBody>
+      </p:sp>
+      <p:pic>
+        <p:nvPicPr>
+          <p:cNvPr id="10" name="Picture 9" descr="A screenshot of a computer program&#10;&#10;AI-generated content may be incorrect.">
+            <a:extLst>
+              <a:ext uri="{FF2B5EF4-FFF2-40B4-BE49-F238E27FC236}">
+                <a16:creationId xmlns:a16="http://schemas.microsoft.com/office/drawing/2014/main" id="{821B9BEE-6B74-A546-0AFE-080F1F3653CD}"/>
+              </a:ext>
+            </a:extLst>
+          </p:cNvPr>
+          <p:cNvPicPr>
+            <a:picLocks noChangeAspect="1"/>
+          </p:cNvPicPr>
+          <p:nvPr/>
+        </p:nvPicPr>
+        <p:blipFill>
+          <a:blip r:embed="rId3"/>
+          <a:stretch>
+            <a:fillRect/>
+          </a:stretch>
+        </p:blipFill>
+        <p:spPr>
+          <a:xfrm>
+            <a:off x="6278355" y="2912104"/>
+            <a:ext cx="5836397" cy="1711708"/>
+          </a:xfrm>
+          <a:prstGeom prst="rect">
+            <a:avLst/>
+          </a:prstGeom>
+        </p:spPr>
+      </p:pic>
+      <p:sp>
+        <p:nvSpPr>
+          <p:cNvPr id="11" name="TextBox 10">
+            <a:extLst>
+              <a:ext uri="{FF2B5EF4-FFF2-40B4-BE49-F238E27FC236}">
+                <a16:creationId xmlns:a16="http://schemas.microsoft.com/office/drawing/2014/main" id="{94B4238C-544B-8D34-8E1B-FFCBCDB430C1}"/>
               </a:ext>
             </a:extLst>
           </p:cNvPr>
@@ -3872,8 +4540,8 @@
         </p:nvSpPr>
         <p:spPr>
           <a:xfrm>
-            <a:off x="10222624" y="3486432"/>
-            <a:ext cx="1422838" cy="369332"/>
+            <a:off x="6547948" y="1823983"/>
+            <a:ext cx="5129048" cy="646331"/>
           </a:xfrm>
           <a:prstGeom prst="rect">
             <a:avLst/>
@@ -3888,7 +4556,49 @@
           <a:p>
             <a:r>
               <a:rPr lang="en-DK" dirty="0"/>
-              <a:t>Click here</a:t>
+              <a:t>Nothing can truly break – the two worst things </a:t>
+            </a:r>
+          </a:p>
+          <a:p>
+            <a:r>
+              <a:rPr lang="en-GB" dirty="0"/>
+              <a:t>are error messages or incorrect results</a:t>
+            </a:r>
+            <a:endParaRPr lang="en-DK" dirty="0"/>
+          </a:p>
+        </p:txBody>
+      </p:sp>
+      <p:sp>
+        <p:nvSpPr>
+          <p:cNvPr id="12" name="TextBox 11">
+            <a:extLst>
+              <a:ext uri="{FF2B5EF4-FFF2-40B4-BE49-F238E27FC236}">
+                <a16:creationId xmlns:a16="http://schemas.microsoft.com/office/drawing/2014/main" id="{42E97005-89B3-CE1D-E2F5-51C1ACB58CBE}"/>
+              </a:ext>
+            </a:extLst>
+          </p:cNvPr>
+          <p:cNvSpPr txBox="1"/>
+          <p:nvPr/>
+        </p:nvSpPr>
+        <p:spPr>
+          <a:xfrm>
+            <a:off x="6547948" y="5094779"/>
+            <a:ext cx="5129048" cy="646331"/>
+          </a:xfrm>
+          <a:prstGeom prst="rect">
+            <a:avLst/>
+          </a:prstGeom>
+          <a:noFill/>
+        </p:spPr>
+        <p:txBody>
+          <a:bodyPr wrap="square" rtlCol="0">
+            <a:spAutoFit/>
+          </a:bodyPr>
+          <a:lstStyle/>
+          <a:p>
+            <a:r>
+              <a:rPr lang="en-DK" dirty="0"/>
+              <a:t>You will experience errors and make mistakes, but those will help you learn.</a:t>
             </a:r>
           </a:p>
         </p:txBody>
@@ -3896,7 +4606,7 @@
     </p:spTree>
     <p:extLst>
       <p:ext uri="{BB962C8B-B14F-4D97-AF65-F5344CB8AC3E}">
-        <p14:creationId xmlns:p14="http://schemas.microsoft.com/office/powerpoint/2010/main" val="162713403"/>
+        <p14:creationId xmlns:p14="http://schemas.microsoft.com/office/powerpoint/2010/main" val="1490185734"/>
       </p:ext>
     </p:extLst>
   </p:cSld>
@@ -3925,6 +4635,180 @@
       </p:grpSpPr>
       <p:sp>
         <p:nvSpPr>
+          <p:cNvPr id="2" name="Title 1">
+            <a:extLst>
+              <a:ext uri="{FF2B5EF4-FFF2-40B4-BE49-F238E27FC236}">
+                <a16:creationId xmlns:a16="http://schemas.microsoft.com/office/drawing/2014/main" id="{2E450404-3F13-44B9-5EDD-5A7BEA1774C1}"/>
+              </a:ext>
+            </a:extLst>
+          </p:cNvPr>
+          <p:cNvSpPr>
+            <a:spLocks noGrp="1"/>
+          </p:cNvSpPr>
+          <p:nvPr>
+            <p:ph type="title"/>
+          </p:nvPr>
+        </p:nvSpPr>
+        <p:spPr/>
+        <p:txBody>
+          <a:bodyPr/>
+          <a:lstStyle/>
+          <a:p>
+            <a:r>
+              <a:rPr lang="en-DK" dirty="0"/>
+              <a:t>Content: </a:t>
+            </a:r>
+            <a:r>
+              <a:rPr lang="en-GB" dirty="0">
+                <a:hlinkClick r:id="rId2"/>
+              </a:rPr>
+              <a:t>github.com/Mads-PeterVC/imlms/</a:t>
+            </a:r>
+            <a:endParaRPr lang="en-DK" dirty="0"/>
+          </a:p>
+        </p:txBody>
+      </p:sp>
+      <p:pic>
+        <p:nvPicPr>
+          <p:cNvPr id="5" name="Picture 4" descr="A screenshot of a computer&#10;&#10;AI-generated content may be incorrect.">
+            <a:extLst>
+              <a:ext uri="{FF2B5EF4-FFF2-40B4-BE49-F238E27FC236}">
+                <a16:creationId xmlns:a16="http://schemas.microsoft.com/office/drawing/2014/main" id="{6208F183-49DA-2CEA-381E-56D4FA3418A0}"/>
+              </a:ext>
+            </a:extLst>
+          </p:cNvPr>
+          <p:cNvPicPr>
+            <a:picLocks noChangeAspect="1"/>
+          </p:cNvPicPr>
+          <p:nvPr/>
+        </p:nvPicPr>
+        <p:blipFill>
+          <a:blip r:embed="rId3"/>
+          <a:stretch>
+            <a:fillRect/>
+          </a:stretch>
+        </p:blipFill>
+        <p:spPr>
+          <a:xfrm>
+            <a:off x="1969376" y="1937188"/>
+            <a:ext cx="7772400" cy="3937000"/>
+          </a:xfrm>
+          <a:prstGeom prst="rect">
+            <a:avLst/>
+          </a:prstGeom>
+        </p:spPr>
+      </p:pic>
+      <p:cxnSp>
+        <p:nvCxnSpPr>
+          <p:cNvPr id="7" name="Straight Arrow Connector 6">
+            <a:extLst>
+              <a:ext uri="{FF2B5EF4-FFF2-40B4-BE49-F238E27FC236}">
+                <a16:creationId xmlns:a16="http://schemas.microsoft.com/office/drawing/2014/main" id="{042EAC75-3377-6A58-E4E9-9980E459011A}"/>
+              </a:ext>
+            </a:extLst>
+          </p:cNvPr>
+          <p:cNvCxnSpPr>
+            <a:cxnSpLocks/>
+          </p:cNvCxnSpPr>
+          <p:nvPr/>
+        </p:nvCxnSpPr>
+        <p:spPr>
+          <a:xfrm flipH="1">
+            <a:off x="6180083" y="3710152"/>
+            <a:ext cx="4042541" cy="195536"/>
+          </a:xfrm>
+          <a:prstGeom prst="straightConnector1">
+            <a:avLst/>
+          </a:prstGeom>
+          <a:ln>
+            <a:solidFill>
+              <a:srgbClr val="FF0000"/>
+            </a:solidFill>
+            <a:tailEnd type="triangle"/>
+          </a:ln>
+        </p:spPr>
+        <p:style>
+          <a:lnRef idx="2">
+            <a:schemeClr val="accent1"/>
+          </a:lnRef>
+          <a:fillRef idx="0">
+            <a:schemeClr val="accent1"/>
+          </a:fillRef>
+          <a:effectRef idx="1">
+            <a:schemeClr val="accent1"/>
+          </a:effectRef>
+          <a:fontRef idx="minor">
+            <a:schemeClr val="tx1"/>
+          </a:fontRef>
+        </p:style>
+      </p:cxnSp>
+      <p:sp>
+        <p:nvSpPr>
+          <p:cNvPr id="9" name="TextBox 8">
+            <a:extLst>
+              <a:ext uri="{FF2B5EF4-FFF2-40B4-BE49-F238E27FC236}">
+                <a16:creationId xmlns:a16="http://schemas.microsoft.com/office/drawing/2014/main" id="{DCB6B069-F8E3-AB79-A68E-4C5BCEEE5023}"/>
+              </a:ext>
+            </a:extLst>
+          </p:cNvPr>
+          <p:cNvSpPr txBox="1"/>
+          <p:nvPr/>
+        </p:nvSpPr>
+        <p:spPr>
+          <a:xfrm>
+            <a:off x="10222624" y="3486432"/>
+            <a:ext cx="1422838" cy="369332"/>
+          </a:xfrm>
+          <a:prstGeom prst="rect">
+            <a:avLst/>
+          </a:prstGeom>
+          <a:noFill/>
+        </p:spPr>
+        <p:txBody>
+          <a:bodyPr wrap="square" rtlCol="0">
+            <a:spAutoFit/>
+          </a:bodyPr>
+          <a:lstStyle/>
+          <a:p>
+            <a:r>
+              <a:rPr lang="en-DK" dirty="0"/>
+              <a:t>Click here</a:t>
+            </a:r>
+          </a:p>
+        </p:txBody>
+      </p:sp>
+    </p:spTree>
+    <p:extLst>
+      <p:ext uri="{BB962C8B-B14F-4D97-AF65-F5344CB8AC3E}">
+        <p14:creationId xmlns:p14="http://schemas.microsoft.com/office/powerpoint/2010/main" val="162713403"/>
+      </p:ext>
+    </p:extLst>
+  </p:cSld>
+  <p:clrMapOvr>
+    <a:masterClrMapping/>
+  </p:clrMapOvr>
+</p:sld>
+</file>
+
+<file path=ppt/slides/slide7.xml><?xml version="1.0" encoding="utf-8"?>
+<p:sld xmlns:a="http://schemas.openxmlformats.org/drawingml/2006/main" xmlns:r="http://schemas.openxmlformats.org/officeDocument/2006/relationships" xmlns:p="http://schemas.openxmlformats.org/presentationml/2006/main">
+  <p:cSld>
+    <p:spTree>
+      <p:nvGrpSpPr>
+        <p:cNvPr id="1" name=""/>
+        <p:cNvGrpSpPr/>
+        <p:nvPr/>
+      </p:nvGrpSpPr>
+      <p:grpSpPr>
+        <a:xfrm>
+          <a:off x="0" y="0"/>
+          <a:ext cx="0" cy="0"/>
+          <a:chOff x="0" y="0"/>
+          <a:chExt cx="0" cy="0"/>
+        </a:xfrm>
+      </p:grpSpPr>
+      <p:sp>
+        <p:nvSpPr>
           <p:cNvPr id="5" name="Title 1">
             <a:extLst>
               <a:ext uri="{FF2B5EF4-FFF2-40B4-BE49-F238E27FC236}">
@@ -3963,10 +4847,570 @@
           </a:p>
         </p:txBody>
       </p:sp>
+      <p:pic>
+        <p:nvPicPr>
+          <p:cNvPr id="9" name="Picture 8" descr="A screenshot of a computer&#10;&#10;AI-generated content may be incorrect.">
+            <a:extLst>
+              <a:ext uri="{FF2B5EF4-FFF2-40B4-BE49-F238E27FC236}">
+                <a16:creationId xmlns:a16="http://schemas.microsoft.com/office/drawing/2014/main" id="{9157FFE2-DD00-3C35-A89A-4E8A594DC058}"/>
+              </a:ext>
+            </a:extLst>
+          </p:cNvPr>
+          <p:cNvPicPr>
+            <a:picLocks noChangeAspect="1"/>
+          </p:cNvPicPr>
+          <p:nvPr/>
+        </p:nvPicPr>
+        <p:blipFill>
+          <a:blip r:embed="rId3"/>
+          <a:stretch>
+            <a:fillRect/>
+          </a:stretch>
+        </p:blipFill>
+        <p:spPr>
+          <a:xfrm>
+            <a:off x="2199290" y="1797269"/>
+            <a:ext cx="7772400" cy="4379628"/>
+          </a:xfrm>
+          <a:prstGeom prst="rect">
+            <a:avLst/>
+          </a:prstGeom>
+        </p:spPr>
+      </p:pic>
+      <p:cxnSp>
+        <p:nvCxnSpPr>
+          <p:cNvPr id="10" name="Straight Arrow Connector 9">
+            <a:extLst>
+              <a:ext uri="{FF2B5EF4-FFF2-40B4-BE49-F238E27FC236}">
+                <a16:creationId xmlns:a16="http://schemas.microsoft.com/office/drawing/2014/main" id="{B7E3C888-20ED-62D8-C8D2-F0A9EB9A6D5A}"/>
+              </a:ext>
+            </a:extLst>
+          </p:cNvPr>
+          <p:cNvCxnSpPr>
+            <a:cxnSpLocks/>
+          </p:cNvCxnSpPr>
+          <p:nvPr/>
+        </p:nvCxnSpPr>
+        <p:spPr>
+          <a:xfrm flipH="1">
+            <a:off x="6879102" y="3710152"/>
+            <a:ext cx="3343522" cy="650833"/>
+          </a:xfrm>
+          <a:prstGeom prst="straightConnector1">
+            <a:avLst/>
+          </a:prstGeom>
+          <a:ln>
+            <a:solidFill>
+              <a:srgbClr val="FF0000"/>
+            </a:solidFill>
+            <a:tailEnd type="triangle"/>
+          </a:ln>
+        </p:spPr>
+        <p:style>
+          <a:lnRef idx="2">
+            <a:schemeClr val="accent1"/>
+          </a:lnRef>
+          <a:fillRef idx="0">
+            <a:schemeClr val="accent1"/>
+          </a:fillRef>
+          <a:effectRef idx="1">
+            <a:schemeClr val="accent1"/>
+          </a:effectRef>
+          <a:fontRef idx="minor">
+            <a:schemeClr val="tx1"/>
+          </a:fontRef>
+        </p:style>
+      </p:cxnSp>
+      <p:sp>
+        <p:nvSpPr>
+          <p:cNvPr id="11" name="TextBox 10">
+            <a:extLst>
+              <a:ext uri="{FF2B5EF4-FFF2-40B4-BE49-F238E27FC236}">
+                <a16:creationId xmlns:a16="http://schemas.microsoft.com/office/drawing/2014/main" id="{C0B3471F-6ADB-F72E-E9D0-BCC44ECF6D12}"/>
+              </a:ext>
+            </a:extLst>
+          </p:cNvPr>
+          <p:cNvSpPr txBox="1"/>
+          <p:nvPr/>
+        </p:nvSpPr>
+        <p:spPr>
+          <a:xfrm>
+            <a:off x="10222624" y="3525486"/>
+            <a:ext cx="1422838" cy="369332"/>
+          </a:xfrm>
+          <a:prstGeom prst="rect">
+            <a:avLst/>
+          </a:prstGeom>
+          <a:noFill/>
+        </p:spPr>
+        <p:txBody>
+          <a:bodyPr wrap="square" rtlCol="0">
+            <a:spAutoFit/>
+          </a:bodyPr>
+          <a:lstStyle/>
+          <a:p>
+            <a:r>
+              <a:rPr lang="en-DK" dirty="0"/>
+              <a:t>Click here</a:t>
+            </a:r>
+          </a:p>
+        </p:txBody>
+      </p:sp>
     </p:spTree>
     <p:extLst>
       <p:ext uri="{BB962C8B-B14F-4D97-AF65-F5344CB8AC3E}">
         <p14:creationId xmlns:p14="http://schemas.microsoft.com/office/powerpoint/2010/main" val="2110181978"/>
+      </p:ext>
+    </p:extLst>
+  </p:cSld>
+  <p:clrMapOvr>
+    <a:masterClrMapping/>
+  </p:clrMapOvr>
+</p:sld>
+</file>
+
+<file path=ppt/slides/slide8.xml><?xml version="1.0" encoding="utf-8"?>
+<p:sld xmlns:a="http://schemas.openxmlformats.org/drawingml/2006/main" xmlns:r="http://schemas.openxmlformats.org/officeDocument/2006/relationships" xmlns:p="http://schemas.openxmlformats.org/presentationml/2006/main">
+  <p:cSld>
+    <p:spTree>
+      <p:nvGrpSpPr>
+        <p:cNvPr id="1" name="">
+          <a:extLst>
+            <a:ext uri="{FF2B5EF4-FFF2-40B4-BE49-F238E27FC236}">
+              <a16:creationId xmlns:a16="http://schemas.microsoft.com/office/drawing/2014/main" id="{D25AD5E3-A06D-5DE2-6E30-27E9328E3CEE}"/>
+            </a:ext>
+          </a:extLst>
+        </p:cNvPr>
+        <p:cNvGrpSpPr/>
+        <p:nvPr/>
+      </p:nvGrpSpPr>
+      <p:grpSpPr>
+        <a:xfrm>
+          <a:off x="0" y="0"/>
+          <a:ext cx="0" cy="0"/>
+          <a:chOff x="0" y="0"/>
+          <a:chExt cx="0" cy="0"/>
+        </a:xfrm>
+      </p:grpSpPr>
+      <p:sp>
+        <p:nvSpPr>
+          <p:cNvPr id="5" name="Title 1">
+            <a:extLst>
+              <a:ext uri="{FF2B5EF4-FFF2-40B4-BE49-F238E27FC236}">
+                <a16:creationId xmlns:a16="http://schemas.microsoft.com/office/drawing/2014/main" id="{04FCC7D1-007B-0EC2-5EF8-6702A551A0A9}"/>
+              </a:ext>
+            </a:extLst>
+          </p:cNvPr>
+          <p:cNvSpPr>
+            <a:spLocks noGrp="1"/>
+          </p:cNvSpPr>
+          <p:nvPr>
+            <p:ph type="title"/>
+          </p:nvPr>
+        </p:nvSpPr>
+        <p:spPr>
+          <a:xfrm>
+            <a:off x="827690" y="365125"/>
+            <a:ext cx="10515600" cy="1325563"/>
+          </a:xfrm>
+        </p:spPr>
+        <p:txBody>
+          <a:bodyPr/>
+          <a:lstStyle/>
+          <a:p>
+            <a:r>
+              <a:rPr lang="en-DK" dirty="0"/>
+              <a:t>Content: </a:t>
+            </a:r>
+            <a:r>
+              <a:rPr lang="en-GB" dirty="0">
+                <a:hlinkClick r:id="rId2"/>
+              </a:rPr>
+              <a:t>github.com/Mads-PeterVC/imlms/</a:t>
+            </a:r>
+            <a:endParaRPr lang="en-DK" dirty="0"/>
+          </a:p>
+        </p:txBody>
+      </p:sp>
+      <p:pic>
+        <p:nvPicPr>
+          <p:cNvPr id="6" name="Picture 5" descr="A screenshot of a computer&#10;&#10;AI-generated content may be incorrect.">
+            <a:extLst>
+              <a:ext uri="{FF2B5EF4-FFF2-40B4-BE49-F238E27FC236}">
+                <a16:creationId xmlns:a16="http://schemas.microsoft.com/office/drawing/2014/main" id="{36223513-BCB3-F58D-C7F5-BFBC3D1513E9}"/>
+              </a:ext>
+            </a:extLst>
+          </p:cNvPr>
+          <p:cNvPicPr>
+            <a:picLocks noChangeAspect="1"/>
+          </p:cNvPicPr>
+          <p:nvPr/>
+        </p:nvPicPr>
+        <p:blipFill>
+          <a:blip r:embed="rId3"/>
+          <a:stretch>
+            <a:fillRect/>
+          </a:stretch>
+        </p:blipFill>
+        <p:spPr>
+          <a:xfrm>
+            <a:off x="1145628" y="1690688"/>
+            <a:ext cx="9165020" cy="4832005"/>
+          </a:xfrm>
+          <a:prstGeom prst="rect">
+            <a:avLst/>
+          </a:prstGeom>
+        </p:spPr>
+      </p:pic>
+      <p:cxnSp>
+        <p:nvCxnSpPr>
+          <p:cNvPr id="7" name="Straight Arrow Connector 6">
+            <a:extLst>
+              <a:ext uri="{FF2B5EF4-FFF2-40B4-BE49-F238E27FC236}">
+                <a16:creationId xmlns:a16="http://schemas.microsoft.com/office/drawing/2014/main" id="{E4AFCC91-7A21-770D-A7CD-14F774989FD6}"/>
+              </a:ext>
+            </a:extLst>
+          </p:cNvPr>
+          <p:cNvCxnSpPr>
+            <a:cxnSpLocks/>
+          </p:cNvCxnSpPr>
+          <p:nvPr/>
+        </p:nvCxnSpPr>
+        <p:spPr>
+          <a:xfrm flipH="1" flipV="1">
+            <a:off x="10110951" y="1923393"/>
+            <a:ext cx="399393" cy="73572"/>
+          </a:xfrm>
+          <a:prstGeom prst="straightConnector1">
+            <a:avLst/>
+          </a:prstGeom>
+          <a:ln>
+            <a:solidFill>
+              <a:srgbClr val="FF0000"/>
+            </a:solidFill>
+            <a:tailEnd type="triangle"/>
+          </a:ln>
+        </p:spPr>
+        <p:style>
+          <a:lnRef idx="2">
+            <a:schemeClr val="accent1"/>
+          </a:lnRef>
+          <a:fillRef idx="0">
+            <a:schemeClr val="accent1"/>
+          </a:fillRef>
+          <a:effectRef idx="1">
+            <a:schemeClr val="accent1"/>
+          </a:effectRef>
+          <a:fontRef idx="minor">
+            <a:schemeClr val="tx1"/>
+          </a:fontRef>
+        </p:style>
+      </p:cxnSp>
+      <p:sp>
+        <p:nvSpPr>
+          <p:cNvPr id="8" name="TextBox 7">
+            <a:extLst>
+              <a:ext uri="{FF2B5EF4-FFF2-40B4-BE49-F238E27FC236}">
+                <a16:creationId xmlns:a16="http://schemas.microsoft.com/office/drawing/2014/main" id="{93DA7851-1F36-AA36-1664-56C1EFA03993}"/>
+              </a:ext>
+            </a:extLst>
+          </p:cNvPr>
+          <p:cNvSpPr txBox="1"/>
+          <p:nvPr/>
+        </p:nvSpPr>
+        <p:spPr>
+          <a:xfrm>
+            <a:off x="10541876" y="1812299"/>
+            <a:ext cx="1422838" cy="923330"/>
+          </a:xfrm>
+          <a:prstGeom prst="rect">
+            <a:avLst/>
+          </a:prstGeom>
+          <a:noFill/>
+        </p:spPr>
+        <p:txBody>
+          <a:bodyPr wrap="square" rtlCol="0">
+            <a:spAutoFit/>
+          </a:bodyPr>
+          <a:lstStyle/>
+          <a:p>
+            <a:r>
+              <a:rPr lang="en-DK" dirty="0"/>
+              <a:t>Sign in to be able to continue </a:t>
+            </a:r>
+          </a:p>
+        </p:txBody>
+      </p:sp>
+      <p:sp>
+        <p:nvSpPr>
+          <p:cNvPr id="18" name="TextBox 17">
+            <a:extLst>
+              <a:ext uri="{FF2B5EF4-FFF2-40B4-BE49-F238E27FC236}">
+                <a16:creationId xmlns:a16="http://schemas.microsoft.com/office/drawing/2014/main" id="{EA640F6D-1FBB-6638-62A8-EAFB50EA6432}"/>
+              </a:ext>
+            </a:extLst>
+          </p:cNvPr>
+          <p:cNvSpPr txBox="1"/>
+          <p:nvPr/>
+        </p:nvSpPr>
+        <p:spPr>
+          <a:xfrm>
+            <a:off x="5901559" y="2596055"/>
+            <a:ext cx="3016469" cy="923330"/>
+          </a:xfrm>
+          <a:prstGeom prst="rect">
+            <a:avLst/>
+          </a:prstGeom>
+          <a:solidFill>
+            <a:schemeClr val="bg1"/>
+          </a:solidFill>
+        </p:spPr>
+        <p:txBody>
+          <a:bodyPr wrap="square" rtlCol="0">
+            <a:spAutoFit/>
+          </a:bodyPr>
+          <a:lstStyle/>
+          <a:p>
+            <a:r>
+              <a:rPr lang="en-DK" dirty="0"/>
+              <a:t>Once signed in you can run a cell. [ctrl-enter] or click the arrow</a:t>
+            </a:r>
+          </a:p>
+        </p:txBody>
+      </p:sp>
+      <p:cxnSp>
+        <p:nvCxnSpPr>
+          <p:cNvPr id="19" name="Straight Arrow Connector 18">
+            <a:extLst>
+              <a:ext uri="{FF2B5EF4-FFF2-40B4-BE49-F238E27FC236}">
+                <a16:creationId xmlns:a16="http://schemas.microsoft.com/office/drawing/2014/main" id="{60EFDC9F-FFB9-9198-A846-23499AA4CFB6}"/>
+              </a:ext>
+            </a:extLst>
+          </p:cNvPr>
+          <p:cNvCxnSpPr>
+            <a:cxnSpLocks/>
+          </p:cNvCxnSpPr>
+          <p:nvPr/>
+        </p:nvCxnSpPr>
+        <p:spPr>
+          <a:xfrm flipH="1" flipV="1">
+            <a:off x="1881352" y="2596055"/>
+            <a:ext cx="4004441" cy="175621"/>
+          </a:xfrm>
+          <a:prstGeom prst="straightConnector1">
+            <a:avLst/>
+          </a:prstGeom>
+          <a:ln>
+            <a:solidFill>
+              <a:srgbClr val="FF0000"/>
+            </a:solidFill>
+            <a:tailEnd type="triangle"/>
+          </a:ln>
+        </p:spPr>
+        <p:style>
+          <a:lnRef idx="2">
+            <a:schemeClr val="accent1"/>
+          </a:lnRef>
+          <a:fillRef idx="0">
+            <a:schemeClr val="accent1"/>
+          </a:fillRef>
+          <a:effectRef idx="1">
+            <a:schemeClr val="accent1"/>
+          </a:effectRef>
+          <a:fontRef idx="minor">
+            <a:schemeClr val="tx1"/>
+          </a:fontRef>
+        </p:style>
+      </p:cxnSp>
+      <p:cxnSp>
+        <p:nvCxnSpPr>
+          <p:cNvPr id="21" name="Straight Arrow Connector 20">
+            <a:extLst>
+              <a:ext uri="{FF2B5EF4-FFF2-40B4-BE49-F238E27FC236}">
+                <a16:creationId xmlns:a16="http://schemas.microsoft.com/office/drawing/2014/main" id="{656798D9-E106-04DF-678F-3BF675ACC333}"/>
+              </a:ext>
+            </a:extLst>
+          </p:cNvPr>
+          <p:cNvCxnSpPr>
+            <a:cxnSpLocks/>
+          </p:cNvCxnSpPr>
+          <p:nvPr/>
+        </p:nvCxnSpPr>
+        <p:spPr>
+          <a:xfrm flipH="1">
+            <a:off x="1681656" y="3016251"/>
+            <a:ext cx="4219903" cy="503134"/>
+          </a:xfrm>
+          <a:prstGeom prst="straightConnector1">
+            <a:avLst/>
+          </a:prstGeom>
+          <a:ln>
+            <a:solidFill>
+              <a:srgbClr val="FF0000"/>
+            </a:solidFill>
+            <a:tailEnd type="triangle"/>
+          </a:ln>
+        </p:spPr>
+        <p:style>
+          <a:lnRef idx="2">
+            <a:schemeClr val="accent1"/>
+          </a:lnRef>
+          <a:fillRef idx="0">
+            <a:schemeClr val="accent1"/>
+          </a:fillRef>
+          <a:effectRef idx="1">
+            <a:schemeClr val="accent1"/>
+          </a:effectRef>
+          <a:fontRef idx="minor">
+            <a:schemeClr val="tx1"/>
+          </a:fontRef>
+        </p:style>
+      </p:cxnSp>
+    </p:spTree>
+    <p:extLst>
+      <p:ext uri="{BB962C8B-B14F-4D97-AF65-F5344CB8AC3E}">
+        <p14:creationId xmlns:p14="http://schemas.microsoft.com/office/powerpoint/2010/main" val="3873987938"/>
+      </p:ext>
+    </p:extLst>
+  </p:cSld>
+  <p:clrMapOvr>
+    <a:masterClrMapping/>
+  </p:clrMapOvr>
+</p:sld>
+</file>
+
+<file path=ppt/slides/slide9.xml><?xml version="1.0" encoding="utf-8"?>
+<p:sld xmlns:a="http://schemas.openxmlformats.org/drawingml/2006/main" xmlns:r="http://schemas.openxmlformats.org/officeDocument/2006/relationships" xmlns:p="http://schemas.openxmlformats.org/presentationml/2006/main">
+  <p:cSld>
+    <p:spTree>
+      <p:nvGrpSpPr>
+        <p:cNvPr id="1" name="">
+          <a:extLst>
+            <a:ext uri="{FF2B5EF4-FFF2-40B4-BE49-F238E27FC236}">
+              <a16:creationId xmlns:a16="http://schemas.microsoft.com/office/drawing/2014/main" id="{6AB6768E-8D27-DF04-8210-B95FAC65FC34}"/>
+            </a:ext>
+          </a:extLst>
+        </p:cNvPr>
+        <p:cNvGrpSpPr/>
+        <p:nvPr/>
+      </p:nvGrpSpPr>
+      <p:grpSpPr>
+        <a:xfrm>
+          <a:off x="0" y="0"/>
+          <a:ext cx="0" cy="0"/>
+          <a:chOff x="0" y="0"/>
+          <a:chExt cx="0" cy="0"/>
+        </a:xfrm>
+      </p:grpSpPr>
+      <p:sp>
+        <p:nvSpPr>
+          <p:cNvPr id="5" name="Title 1">
+            <a:extLst>
+              <a:ext uri="{FF2B5EF4-FFF2-40B4-BE49-F238E27FC236}">
+                <a16:creationId xmlns:a16="http://schemas.microsoft.com/office/drawing/2014/main" id="{C8816642-7D65-D2C6-5D5D-51F3A52B5DBA}"/>
+              </a:ext>
+            </a:extLst>
+          </p:cNvPr>
+          <p:cNvSpPr>
+            <a:spLocks noGrp="1"/>
+          </p:cNvSpPr>
+          <p:nvPr>
+            <p:ph type="title"/>
+          </p:nvPr>
+        </p:nvSpPr>
+        <p:spPr>
+          <a:xfrm>
+            <a:off x="827690" y="365125"/>
+            <a:ext cx="10515600" cy="1325563"/>
+          </a:xfrm>
+        </p:spPr>
+        <p:txBody>
+          <a:bodyPr/>
+          <a:lstStyle/>
+          <a:p>
+            <a:r>
+              <a:rPr lang="en-DK" dirty="0"/>
+              <a:t>Content: </a:t>
+            </a:r>
+            <a:r>
+              <a:rPr lang="en-GB" dirty="0">
+                <a:hlinkClick r:id="rId2"/>
+              </a:rPr>
+              <a:t>github.com/Mads-PeterVC/imlms/</a:t>
+            </a:r>
+            <a:endParaRPr lang="en-DK" dirty="0"/>
+          </a:p>
+        </p:txBody>
+      </p:sp>
+      <p:pic>
+        <p:nvPicPr>
+          <p:cNvPr id="3" name="Picture 2" descr="A screenshot of a computer&#10;&#10;AI-generated content may be incorrect.">
+            <a:extLst>
+              <a:ext uri="{FF2B5EF4-FFF2-40B4-BE49-F238E27FC236}">
+                <a16:creationId xmlns:a16="http://schemas.microsoft.com/office/drawing/2014/main" id="{42AAE685-FA88-88C7-8E29-0E8CFDAE16ED}"/>
+              </a:ext>
+            </a:extLst>
+          </p:cNvPr>
+          <p:cNvPicPr>
+            <a:picLocks noChangeAspect="1"/>
+          </p:cNvPicPr>
+          <p:nvPr/>
+        </p:nvPicPr>
+        <p:blipFill>
+          <a:blip r:embed="rId3"/>
+          <a:stretch>
+            <a:fillRect/>
+          </a:stretch>
+        </p:blipFill>
+        <p:spPr>
+          <a:xfrm>
+            <a:off x="999776" y="1819883"/>
+            <a:ext cx="9055070" cy="4444283"/>
+          </a:xfrm>
+          <a:prstGeom prst="rect">
+            <a:avLst/>
+          </a:prstGeom>
+        </p:spPr>
+      </p:pic>
+      <p:sp>
+        <p:nvSpPr>
+          <p:cNvPr id="4" name="TextBox 3">
+            <a:extLst>
+              <a:ext uri="{FF2B5EF4-FFF2-40B4-BE49-F238E27FC236}">
+                <a16:creationId xmlns:a16="http://schemas.microsoft.com/office/drawing/2014/main" id="{6550540B-FCCD-9F97-053D-2AE455E53080}"/>
+              </a:ext>
+            </a:extLst>
+          </p:cNvPr>
+          <p:cNvSpPr txBox="1"/>
+          <p:nvPr/>
+        </p:nvSpPr>
+        <p:spPr>
+          <a:xfrm>
+            <a:off x="10226566" y="2186152"/>
+            <a:ext cx="1671144" cy="2308324"/>
+          </a:xfrm>
+          <a:prstGeom prst="rect">
+            <a:avLst/>
+          </a:prstGeom>
+          <a:noFill/>
+        </p:spPr>
+        <p:txBody>
+          <a:bodyPr wrap="square" rtlCol="0">
+            <a:spAutoFit/>
+          </a:bodyPr>
+          <a:lstStyle/>
+          <a:p>
+            <a:r>
+              <a:rPr lang="en-DK" dirty="0"/>
+              <a:t>Some of the cells will provide examples without requiring you to write any code.</a:t>
+            </a:r>
+          </a:p>
+        </p:txBody>
+      </p:sp>
+    </p:spTree>
+    <p:extLst>
+      <p:ext uri="{BB962C8B-B14F-4D97-AF65-F5344CB8AC3E}">
+        <p14:creationId xmlns:p14="http://schemas.microsoft.com/office/powerpoint/2010/main" val="3598292663"/>
       </p:ext>
     </p:extLst>
   </p:cSld>

</xml_diff>